<commit_message>
Update Top N script and code
Update Top N script and code
</commit_message>
<xml_diff>
--- a/PreQual 2.0 - 21'03.pptx
+++ b/PreQual 2.0 - 21'03.pptx
@@ -7,7 +7,8 @@
   <p:sldIdLst>
     <p:sldId id="256" r:id="rId2"/>
     <p:sldId id="257" r:id="rId3"/>
-    <p:sldId id="258" r:id="rId4"/>
+    <p:sldId id="259" r:id="rId4"/>
+    <p:sldId id="258" r:id="rId5"/>
   </p:sldIdLst>
   <p:sldSz cx="12192000" cy="6858000"/>
   <p:notesSz cx="6858000" cy="9144000"/>
@@ -261,7 +262,7 @@
           <a:p>
             <a:fld id="{6E02C3BE-8A0E-4AF7-A0BE-041EE7A2F663}" type="datetimeFigureOut">
               <a:rPr lang="zh-TW" altLang="en-US" smtClean="0"/>
-              <a:t>2021/3/9</a:t>
+              <a:t>2021/3/25</a:t>
             </a:fld>
             <a:endParaRPr lang="zh-TW" altLang="en-US"/>
           </a:p>
@@ -459,7 +460,7 @@
           <a:p>
             <a:fld id="{6E02C3BE-8A0E-4AF7-A0BE-041EE7A2F663}" type="datetimeFigureOut">
               <a:rPr lang="zh-TW" altLang="en-US" smtClean="0"/>
-              <a:t>2021/3/9</a:t>
+              <a:t>2021/3/25</a:t>
             </a:fld>
             <a:endParaRPr lang="zh-TW" altLang="en-US"/>
           </a:p>
@@ -667,7 +668,7 @@
           <a:p>
             <a:fld id="{6E02C3BE-8A0E-4AF7-A0BE-041EE7A2F663}" type="datetimeFigureOut">
               <a:rPr lang="zh-TW" altLang="en-US" smtClean="0"/>
-              <a:t>2021/3/9</a:t>
+              <a:t>2021/3/25</a:t>
             </a:fld>
             <a:endParaRPr lang="zh-TW" altLang="en-US"/>
           </a:p>
@@ -865,7 +866,7 @@
           <a:p>
             <a:fld id="{6E02C3BE-8A0E-4AF7-A0BE-041EE7A2F663}" type="datetimeFigureOut">
               <a:rPr lang="zh-TW" altLang="en-US" smtClean="0"/>
-              <a:t>2021/3/9</a:t>
+              <a:t>2021/3/25</a:t>
             </a:fld>
             <a:endParaRPr lang="zh-TW" altLang="en-US"/>
           </a:p>
@@ -1140,7 +1141,7 @@
           <a:p>
             <a:fld id="{6E02C3BE-8A0E-4AF7-A0BE-041EE7A2F663}" type="datetimeFigureOut">
               <a:rPr lang="zh-TW" altLang="en-US" smtClean="0"/>
-              <a:t>2021/3/9</a:t>
+              <a:t>2021/3/25</a:t>
             </a:fld>
             <a:endParaRPr lang="zh-TW" altLang="en-US"/>
           </a:p>
@@ -1405,7 +1406,7 @@
           <a:p>
             <a:fld id="{6E02C3BE-8A0E-4AF7-A0BE-041EE7A2F663}" type="datetimeFigureOut">
               <a:rPr lang="zh-TW" altLang="en-US" smtClean="0"/>
-              <a:t>2021/3/9</a:t>
+              <a:t>2021/3/25</a:t>
             </a:fld>
             <a:endParaRPr lang="zh-TW" altLang="en-US"/>
           </a:p>
@@ -1817,7 +1818,7 @@
           <a:p>
             <a:fld id="{6E02C3BE-8A0E-4AF7-A0BE-041EE7A2F663}" type="datetimeFigureOut">
               <a:rPr lang="zh-TW" altLang="en-US" smtClean="0"/>
-              <a:t>2021/3/9</a:t>
+              <a:t>2021/3/25</a:t>
             </a:fld>
             <a:endParaRPr lang="zh-TW" altLang="en-US"/>
           </a:p>
@@ -1958,7 +1959,7 @@
           <a:p>
             <a:fld id="{6E02C3BE-8A0E-4AF7-A0BE-041EE7A2F663}" type="datetimeFigureOut">
               <a:rPr lang="zh-TW" altLang="en-US" smtClean="0"/>
-              <a:t>2021/3/9</a:t>
+              <a:t>2021/3/25</a:t>
             </a:fld>
             <a:endParaRPr lang="zh-TW" altLang="en-US"/>
           </a:p>
@@ -2071,7 +2072,7 @@
           <a:p>
             <a:fld id="{6E02C3BE-8A0E-4AF7-A0BE-041EE7A2F663}" type="datetimeFigureOut">
               <a:rPr lang="zh-TW" altLang="en-US" smtClean="0"/>
-              <a:t>2021/3/9</a:t>
+              <a:t>2021/3/25</a:t>
             </a:fld>
             <a:endParaRPr lang="zh-TW" altLang="en-US"/>
           </a:p>
@@ -2382,7 +2383,7 @@
           <a:p>
             <a:fld id="{6E02C3BE-8A0E-4AF7-A0BE-041EE7A2F663}" type="datetimeFigureOut">
               <a:rPr lang="zh-TW" altLang="en-US" smtClean="0"/>
-              <a:t>2021/3/9</a:t>
+              <a:t>2021/3/25</a:t>
             </a:fld>
             <a:endParaRPr lang="zh-TW" altLang="en-US"/>
           </a:p>
@@ -2670,7 +2671,7 @@
           <a:p>
             <a:fld id="{6E02C3BE-8A0E-4AF7-A0BE-041EE7A2F663}" type="datetimeFigureOut">
               <a:rPr lang="zh-TW" altLang="en-US" smtClean="0"/>
-              <a:t>2021/3/9</a:t>
+              <a:t>2021/3/25</a:t>
             </a:fld>
             <a:endParaRPr lang="zh-TW" altLang="en-US"/>
           </a:p>
@@ -2913,7 +2914,7 @@
             <a:fld id="{6E02C3BE-8A0E-4AF7-A0BE-041EE7A2F663}" type="datetimeFigureOut">
               <a:rPr lang="zh-TW" altLang="en-US" smtClean="0"/>
               <a:pPr/>
-              <a:t>2021/3/9</a:t>
+              <a:t>2021/3/25</a:t>
             </a:fld>
             <a:endParaRPr lang="zh-TW" altLang="en-US"/>
           </a:p>
@@ -3468,6 +3469,123 @@
           </a:p>
         </p:txBody>
       </p:sp>
+      <p:sp>
+        <p:nvSpPr>
+          <p:cNvPr id="4" name="文字方塊 3">
+            <a:extLst>
+              <a:ext uri="{FF2B5EF4-FFF2-40B4-BE49-F238E27FC236}">
+                <a16:creationId xmlns:a16="http://schemas.microsoft.com/office/drawing/2014/main" id="{253DD7D7-3B6D-423D-AE73-1351B9664181}"/>
+              </a:ext>
+            </a:extLst>
+          </p:cNvPr>
+          <p:cNvSpPr txBox="1"/>
+          <p:nvPr/>
+        </p:nvSpPr>
+        <p:spPr>
+          <a:xfrm>
+            <a:off x="822960" y="2143760"/>
+            <a:ext cx="184731" cy="369332"/>
+          </a:xfrm>
+          <a:prstGeom prst="rect">
+            <a:avLst/>
+          </a:prstGeom>
+          <a:noFill/>
+        </p:spPr>
+        <p:txBody>
+          <a:bodyPr wrap="none" rtlCol="0">
+            <a:spAutoFit/>
+          </a:bodyPr>
+          <a:lstStyle/>
+          <a:p>
+            <a:endParaRPr lang="zh-TW" altLang="en-US"/>
+          </a:p>
+        </p:txBody>
+      </p:sp>
+    </p:spTree>
+    <p:extLst>
+      <p:ext uri="{BB962C8B-B14F-4D97-AF65-F5344CB8AC3E}">
+        <p14:creationId xmlns:p14="http://schemas.microsoft.com/office/powerpoint/2010/main" val="1800894695"/>
+      </p:ext>
+    </p:extLst>
+  </p:cSld>
+  <p:clrMapOvr>
+    <a:masterClrMapping/>
+  </p:clrMapOvr>
+</p:sld>
+</file>
+
+<file path=ppt/slides/slide3.xml><?xml version="1.0" encoding="utf-8"?>
+<p:sld xmlns:a="http://schemas.openxmlformats.org/drawingml/2006/main" xmlns:r="http://schemas.openxmlformats.org/officeDocument/2006/relationships" xmlns:p="http://schemas.openxmlformats.org/presentationml/2006/main">
+  <p:cSld>
+    <p:spTree>
+      <p:nvGrpSpPr>
+        <p:cNvPr id="1" name=""/>
+        <p:cNvGrpSpPr/>
+        <p:nvPr/>
+      </p:nvGrpSpPr>
+      <p:grpSpPr>
+        <a:xfrm>
+          <a:off x="0" y="0"/>
+          <a:ext cx="0" cy="0"/>
+          <a:chOff x="0" y="0"/>
+          <a:chExt cx="0" cy="0"/>
+        </a:xfrm>
+      </p:grpSpPr>
+      <p:sp>
+        <p:nvSpPr>
+          <p:cNvPr id="2" name="標題 1">
+            <a:extLst>
+              <a:ext uri="{FF2B5EF4-FFF2-40B4-BE49-F238E27FC236}">
+                <a16:creationId xmlns:a16="http://schemas.microsoft.com/office/drawing/2014/main" id="{EA657B2E-2CB6-41B0-B833-E687BE10EAF7}"/>
+              </a:ext>
+            </a:extLst>
+          </p:cNvPr>
+          <p:cNvSpPr>
+            <a:spLocks noGrp="1"/>
+          </p:cNvSpPr>
+          <p:nvPr>
+            <p:ph type="title"/>
+          </p:nvPr>
+        </p:nvSpPr>
+        <p:spPr/>
+        <p:txBody>
+          <a:bodyPr/>
+          <a:lstStyle/>
+          <a:p>
+            <a:endParaRPr lang="zh-TW" altLang="en-US"/>
+          </a:p>
+        </p:txBody>
+      </p:sp>
+      <p:sp>
+        <p:nvSpPr>
+          <p:cNvPr id="3" name="內容版面配置區 2">
+            <a:extLst>
+              <a:ext uri="{FF2B5EF4-FFF2-40B4-BE49-F238E27FC236}">
+                <a16:creationId xmlns:a16="http://schemas.microsoft.com/office/drawing/2014/main" id="{595FAF60-A01E-4AAD-8AEF-E24B38A0ABD1}"/>
+              </a:ext>
+            </a:extLst>
+          </p:cNvPr>
+          <p:cNvSpPr>
+            <a:spLocks noGrp="1"/>
+          </p:cNvSpPr>
+          <p:nvPr>
+            <p:ph idx="1"/>
+          </p:nvPr>
+        </p:nvSpPr>
+        <p:spPr>
+          <a:xfrm>
+            <a:off x="546846" y="941295"/>
+            <a:ext cx="11017625" cy="670690"/>
+          </a:xfrm>
+        </p:spPr>
+        <p:txBody>
+          <a:bodyPr/>
+          <a:lstStyle/>
+          <a:p>
+            <a:endParaRPr lang="zh-TW" altLang="en-US"/>
+          </a:p>
+        </p:txBody>
+      </p:sp>
       <p:grpSp>
         <p:nvGrpSpPr>
           <p:cNvPr id="18" name="群組 17">
@@ -4572,7 +4690,7 @@
     </p:spTree>
     <p:extLst>
       <p:ext uri="{BB962C8B-B14F-4D97-AF65-F5344CB8AC3E}">
-        <p14:creationId xmlns:p14="http://schemas.microsoft.com/office/powerpoint/2010/main" val="1800894695"/>
+        <p14:creationId xmlns:p14="http://schemas.microsoft.com/office/powerpoint/2010/main" val="586944127"/>
       </p:ext>
     </p:extLst>
   </p:cSld>
@@ -4582,7 +4700,7 @@
 </p:sld>
 </file>
 
-<file path=ppt/slides/slide3.xml><?xml version="1.0" encoding="utf-8"?>
+<file path=ppt/slides/slide4.xml><?xml version="1.0" encoding="utf-8"?>
 <p:sld xmlns:a="http://schemas.openxmlformats.org/drawingml/2006/main" xmlns:r="http://schemas.openxmlformats.org/officeDocument/2006/relationships" xmlns:p="http://schemas.openxmlformats.org/presentationml/2006/main">
   <p:cSld>
     <p:spTree>

</xml_diff>